<commit_message>
Criado as versões iniciais de login.feature, RunLoginTest.java, LoginSteps.java, classes de massas do navegador e usuario, classes Page Object de criação do navegador, base, login e inventario. Alterado o arquivo pom.xml incluindo todas as importações faltantes: selenium, junit e cucumber. E adicionado uma evidência no Servidor Gitlab.pptx
</commit_message>
<xml_diff>
--- a/Evidências/Servidor Gitlab/Servidor Gitlab.pptx
+++ b/Evidências/Servidor Gitlab/Servidor Gitlab.pptx
@@ -5,10 +5,10 @@
     <p:sldMasterId id="2147483660" r:id="rId4"/>
   </p:sldMasterIdLst>
   <p:notesMasterIdLst>
-    <p:notesMasterId r:id="rId13"/>
+    <p:notesMasterId r:id="rId14"/>
   </p:notesMasterIdLst>
   <p:handoutMasterIdLst>
-    <p:handoutMasterId r:id="rId14"/>
+    <p:handoutMasterId r:id="rId15"/>
   </p:handoutMasterIdLst>
   <p:sldIdLst>
     <p:sldId id="346" r:id="rId5"/>
@@ -17,8 +17,9 @@
     <p:sldId id="347" r:id="rId8"/>
     <p:sldId id="348" r:id="rId9"/>
     <p:sldId id="349" r:id="rId10"/>
-    <p:sldId id="350" r:id="rId11"/>
-    <p:sldId id="268" r:id="rId12"/>
+    <p:sldId id="351" r:id="rId11"/>
+    <p:sldId id="350" r:id="rId12"/>
+    <p:sldId id="268" r:id="rId13"/>
   </p:sldIdLst>
   <p:sldSz cx="9144000" cy="5143500" type="screen16x9"/>
   <p:notesSz cx="6858000" cy="9144000"/>
@@ -5498,6 +5499,36 @@
           </a:p>
         </p:txBody>
       </p:sp>
+      <p:pic>
+        <p:nvPicPr>
+          <p:cNvPr id="5" name="Imagem 4">
+            <a:extLst>
+              <a:ext uri="{FF2B5EF4-FFF2-40B4-BE49-F238E27FC236}">
+                <a16:creationId xmlns:a16="http://schemas.microsoft.com/office/drawing/2014/main" id="{005B60B7-183E-951A-A00E-113A80A379BB}"/>
+              </a:ext>
+            </a:extLst>
+          </p:cNvPr>
+          <p:cNvPicPr>
+            <a:picLocks noChangeAspect="1"/>
+          </p:cNvPicPr>
+          <p:nvPr/>
+        </p:nvPicPr>
+        <p:blipFill>
+          <a:blip r:embed="rId2"/>
+          <a:stretch>
+            <a:fillRect/>
+          </a:stretch>
+        </p:blipFill>
+        <p:spPr>
+          <a:xfrm>
+            <a:off x="140047" y="249436"/>
+            <a:ext cx="8019216" cy="4508608"/>
+          </a:xfrm>
+          <a:prstGeom prst="rect">
+            <a:avLst/>
+          </a:prstGeom>
+        </p:spPr>
+      </p:pic>
     </p:spTree>
     <p:extLst>
       <p:ext uri="{BB962C8B-B14F-4D97-AF65-F5344CB8AC3E}">
@@ -5536,6 +5567,119 @@
           <p:cNvPr id="2" name="Título 1">
             <a:extLst>
               <a:ext uri="{FF2B5EF4-FFF2-40B4-BE49-F238E27FC236}">
+                <a16:creationId xmlns:a16="http://schemas.microsoft.com/office/drawing/2014/main" id="{B50A13C7-DE6F-2614-D2F9-7AF27E70B23E}"/>
+              </a:ext>
+            </a:extLst>
+          </p:cNvPr>
+          <p:cNvSpPr>
+            <a:spLocks noGrp="1"/>
+          </p:cNvSpPr>
+          <p:nvPr>
+            <p:ph type="title"/>
+          </p:nvPr>
+        </p:nvSpPr>
+        <p:spPr/>
+        <p:txBody>
+          <a:bodyPr/>
+          <a:lstStyle/>
+          <a:p>
+            <a:endParaRPr lang="pt-BR"/>
+          </a:p>
+        </p:txBody>
+      </p:sp>
+      <p:sp>
+        <p:nvSpPr>
+          <p:cNvPr id="3" name="Marcador de Posição do Texto 2">
+            <a:extLst>
+              <a:ext uri="{FF2B5EF4-FFF2-40B4-BE49-F238E27FC236}">
+                <a16:creationId xmlns:a16="http://schemas.microsoft.com/office/drawing/2014/main" id="{76EC9CF8-F6F9-103E-5B14-232A257B56DA}"/>
+              </a:ext>
+            </a:extLst>
+          </p:cNvPr>
+          <p:cNvSpPr>
+            <a:spLocks noGrp="1"/>
+          </p:cNvSpPr>
+          <p:nvPr>
+            <p:ph type="body" sz="quarter" idx="11"/>
+          </p:nvPr>
+        </p:nvSpPr>
+        <p:spPr/>
+        <p:txBody>
+          <a:bodyPr/>
+          <a:lstStyle/>
+          <a:p>
+            <a:endParaRPr lang="pt-BR"/>
+          </a:p>
+        </p:txBody>
+      </p:sp>
+      <p:pic>
+        <p:nvPicPr>
+          <p:cNvPr id="5" name="Imagem 4">
+            <a:extLst>
+              <a:ext uri="{FF2B5EF4-FFF2-40B4-BE49-F238E27FC236}">
+                <a16:creationId xmlns:a16="http://schemas.microsoft.com/office/drawing/2014/main" id="{9CF7CD77-A253-353A-A8DA-EBA52AA035C3}"/>
+              </a:ext>
+            </a:extLst>
+          </p:cNvPr>
+          <p:cNvPicPr>
+            <a:picLocks noChangeAspect="1"/>
+          </p:cNvPicPr>
+          <p:nvPr/>
+        </p:nvPicPr>
+        <p:blipFill>
+          <a:blip r:embed="rId2"/>
+          <a:stretch>
+            <a:fillRect/>
+          </a:stretch>
+        </p:blipFill>
+        <p:spPr>
+          <a:xfrm>
+            <a:off x="140047" y="720053"/>
+            <a:ext cx="7737232" cy="4123503"/>
+          </a:xfrm>
+          <a:prstGeom prst="rect">
+            <a:avLst/>
+          </a:prstGeom>
+        </p:spPr>
+      </p:pic>
+    </p:spTree>
+    <p:extLst>
+      <p:ext uri="{BB962C8B-B14F-4D97-AF65-F5344CB8AC3E}">
+        <p14:creationId xmlns:p14="http://schemas.microsoft.com/office/powerpoint/2010/main" val="1838886007"/>
+      </p:ext>
+    </p:extLst>
+  </p:cSld>
+  <p:clrMapOvr>
+    <a:masterClrMapping/>
+  </p:clrMapOvr>
+  <p:transition>
+    <p:fade/>
+  </p:transition>
+</p:sld>
+</file>
+
+<file path=ppt/slides/slide8.xml><?xml version="1.0" encoding="utf-8"?>
+<p:sld xmlns:a="http://schemas.openxmlformats.org/drawingml/2006/main" xmlns:r="http://schemas.openxmlformats.org/officeDocument/2006/relationships" xmlns:p="http://schemas.openxmlformats.org/presentationml/2006/main">
+  <p:cSld>
+    <p:spTree>
+      <p:nvGrpSpPr>
+        <p:cNvPr id="1" name=""/>
+        <p:cNvGrpSpPr/>
+        <p:nvPr/>
+      </p:nvGrpSpPr>
+      <p:grpSpPr>
+        <a:xfrm>
+          <a:off x="0" y="0"/>
+          <a:ext cx="0" cy="0"/>
+          <a:chOff x="0" y="0"/>
+          <a:chExt cx="0" cy="0"/>
+        </a:xfrm>
+      </p:grpSpPr>
+      <p:sp>
+        <p:nvSpPr>
+          <p:cNvPr id="2" name="Título 1">
+            <a:extLst>
+              <a:ext uri="{FF2B5EF4-FFF2-40B4-BE49-F238E27FC236}">
                 <a16:creationId xmlns:a16="http://schemas.microsoft.com/office/drawing/2014/main" id="{53BE87A3-9E54-6873-0BFB-B63B3B63B6EC}"/>
               </a:ext>
             </a:extLst>
@@ -5627,7 +5771,7 @@
 </p:sld>
 </file>
 
-<file path=ppt/slides/slide8.xml><?xml version="1.0" encoding="utf-8"?>
+<file path=ppt/slides/slide9.xml><?xml version="1.0" encoding="utf-8"?>
 <p:sld xmlns:a="http://schemas.openxmlformats.org/drawingml/2006/main" xmlns:r="http://schemas.openxmlformats.org/officeDocument/2006/relationships" xmlns:p="http://schemas.openxmlformats.org/presentationml/2006/main">
   <p:cSld>
     <p:spTree>
@@ -6784,6 +6928,12 @@
 </file>
 
 <file path=customXml/item1.xml><?xml version="1.0" encoding="utf-8"?>
+<p:properties xmlns:p="http://schemas.microsoft.com/office/2006/metadata/properties" xmlns:xsi="http://www.w3.org/2001/XMLSchema-instance" xmlns:pc="http://schemas.microsoft.com/office/infopath/2007/PartnerControls">
+  <documentManagement/>
+</p:properties>
+</file>
+
+<file path=customXml/item2.xml><?xml version="1.0" encoding="utf-8"?>
 <ct:contentTypeSchema xmlns:ct="http://schemas.microsoft.com/office/2006/metadata/contentType" xmlns:ma="http://schemas.microsoft.com/office/2006/metadata/properties/metaAttributes" ct:_="" ma:_="" ma:contentTypeName="Documento" ma:contentTypeID="0x0101003CAFFF3D9FAE1548BBB2997BBDA2558D" ma:contentTypeVersion="13" ma:contentTypeDescription="Crie um novo documento." ma:contentTypeScope="" ma:versionID="241b3220e961965ad778d5ffe0d45c7b">
   <xsd:schema xmlns:xsd="http://www.w3.org/2001/XMLSchema" xmlns:xs="http://www.w3.org/2001/XMLSchema" xmlns:p="http://schemas.microsoft.com/office/2006/metadata/properties" xmlns:ns2="e4b36eca-91f5-4f23-9b42-4916e31c5a2b" xmlns:ns3="87964a91-b32e-490d-8e48-f9696f6aed8d" targetNamespace="http://schemas.microsoft.com/office/2006/metadata/properties" ma:root="true" ma:fieldsID="76d16bf961894de0ad11889824209bdb" ns2:_="" ns3:_="">
     <xsd:import namespace="e4b36eca-91f5-4f23-9b42-4916e31c5a2b"/>
@@ -7006,12 +7156,6 @@
 </ct:contentTypeSchema>
 </file>
 
-<file path=customXml/item2.xml><?xml version="1.0" encoding="utf-8"?>
-<p:properties xmlns:p="http://schemas.microsoft.com/office/2006/metadata/properties" xmlns:xsi="http://www.w3.org/2001/XMLSchema-instance" xmlns:pc="http://schemas.microsoft.com/office/infopath/2007/PartnerControls">
-  <documentManagement/>
-</p:properties>
-</file>
-
 <file path=customXml/item3.xml><?xml version="1.0" encoding="utf-8"?>
 <?mso-contentType ?>
 <FormTemplates xmlns="http://schemas.microsoft.com/sharepoint/v3/contenttype/forms">
@@ -7022,6 +7166,23 @@
 </file>
 
 <file path=customXml/itemProps1.xml><?xml version="1.0" encoding="utf-8"?>
+<ds:datastoreItem xmlns:ds="http://schemas.openxmlformats.org/officeDocument/2006/customXml" ds:itemID="{175F1917-3AC5-441B-BEAD-AA1C5F289112}">
+  <ds:schemaRefs>
+    <ds:schemaRef ds:uri="http://schemas.microsoft.com/office/infopath/2007/PartnerControls"/>
+    <ds:schemaRef ds:uri="http://purl.org/dc/elements/1.1/"/>
+    <ds:schemaRef ds:uri="http://schemas.microsoft.com/office/2006/metadata/properties"/>
+    <ds:schemaRef ds:uri="http://purl.org/dc/terms/"/>
+    <ds:schemaRef ds:uri="e4b36eca-91f5-4f23-9b42-4916e31c5a2b"/>
+    <ds:schemaRef ds:uri="http://schemas.microsoft.com/office/2006/documentManagement/types"/>
+    <ds:schemaRef ds:uri="http://schemas.openxmlformats.org/package/2006/metadata/core-properties"/>
+    <ds:schemaRef ds:uri="87964a91-b32e-490d-8e48-f9696f6aed8d"/>
+    <ds:schemaRef ds:uri="http://www.w3.org/XML/1998/namespace"/>
+    <ds:schemaRef ds:uri="http://purl.org/dc/dcmitype/"/>
+  </ds:schemaRefs>
+</ds:datastoreItem>
+</file>
+
+<file path=customXml/itemProps2.xml><?xml version="1.0" encoding="utf-8"?>
 <ds:datastoreItem xmlns:ds="http://schemas.openxmlformats.org/officeDocument/2006/customXml" ds:itemID="{1C4264D2-8888-4BD5-A374-5B206983EC78}">
   <ds:schemaRefs>
     <ds:schemaRef ds:uri="http://schemas.microsoft.com/office/2006/metadata/contentType"/>
@@ -7040,23 +7201,6 @@
 </ds:datastoreItem>
 </file>
 
-<file path=customXml/itemProps2.xml><?xml version="1.0" encoding="utf-8"?>
-<ds:datastoreItem xmlns:ds="http://schemas.openxmlformats.org/officeDocument/2006/customXml" ds:itemID="{175F1917-3AC5-441B-BEAD-AA1C5F289112}">
-  <ds:schemaRefs>
-    <ds:schemaRef ds:uri="http://schemas.microsoft.com/office/infopath/2007/PartnerControls"/>
-    <ds:schemaRef ds:uri="http://purl.org/dc/elements/1.1/"/>
-    <ds:schemaRef ds:uri="http://schemas.microsoft.com/office/2006/metadata/properties"/>
-    <ds:schemaRef ds:uri="http://purl.org/dc/terms/"/>
-    <ds:schemaRef ds:uri="e4b36eca-91f5-4f23-9b42-4916e31c5a2b"/>
-    <ds:schemaRef ds:uri="http://schemas.microsoft.com/office/2006/documentManagement/types"/>
-    <ds:schemaRef ds:uri="http://schemas.openxmlformats.org/package/2006/metadata/core-properties"/>
-    <ds:schemaRef ds:uri="87964a91-b32e-490d-8e48-f9696f6aed8d"/>
-    <ds:schemaRef ds:uri="http://www.w3.org/XML/1998/namespace"/>
-    <ds:schemaRef ds:uri="http://purl.org/dc/dcmitype/"/>
-  </ds:schemaRefs>
-</ds:datastoreItem>
-</file>
-
 <file path=customXml/itemProps3.xml><?xml version="1.0" encoding="utf-8"?>
 <ds:datastoreItem xmlns:ds="http://schemas.openxmlformats.org/officeDocument/2006/customXml" ds:itemID="{570EC5F2-088E-41B9-A12F-2C72B56359AD}">
   <ds:schemaRefs>

</xml_diff>